<commit_message>
nsort now sorts alpha only separately Simar overview.pptx grammar fixs
</commit_message>
<xml_diff>
--- a/src/docs/Simar overview.pptx
+++ b/src/docs/Simar overview.pptx
@@ -216,7 +216,7 @@
           <a:p>
             <a:fld id="{FCC0B684-8014-45B5-B9C4-47CA9572B093}" type="datetimeFigureOut">
               <a:rPr lang="en-NZ" smtClean="0"/>
-              <a:t>13/02/2012</a:t>
+              <a:t>20/02/2012</a:t>
             </a:fld>
             <a:endParaRPr lang="en-NZ"/>
           </a:p>
@@ -480,7 +480,7 @@
           <a:p>
             <a:fld id="{3ACCE87F-A4BF-4D9A-9320-ACD565033031}" type="datetimeFigureOut">
               <a:rPr lang="en-NZ" smtClean="0"/>
-              <a:t>13/02/2012</a:t>
+              <a:t>20/02/2012</a:t>
             </a:fld>
             <a:endParaRPr lang="en-NZ"/>
           </a:p>
@@ -645,7 +645,7 @@
           <a:p>
             <a:fld id="{3ACCE87F-A4BF-4D9A-9320-ACD565033031}" type="datetimeFigureOut">
               <a:rPr lang="en-NZ" smtClean="0"/>
-              <a:t>13/02/2012</a:t>
+              <a:t>20/02/2012</a:t>
             </a:fld>
             <a:endParaRPr lang="en-NZ"/>
           </a:p>
@@ -820,7 +820,7 @@
           <a:p>
             <a:fld id="{3ACCE87F-A4BF-4D9A-9320-ACD565033031}" type="datetimeFigureOut">
               <a:rPr lang="en-NZ" smtClean="0"/>
-              <a:t>13/02/2012</a:t>
+              <a:t>20/02/2012</a:t>
             </a:fld>
             <a:endParaRPr lang="en-NZ"/>
           </a:p>
@@ -985,7 +985,7 @@
           <a:p>
             <a:fld id="{3ACCE87F-A4BF-4D9A-9320-ACD565033031}" type="datetimeFigureOut">
               <a:rPr lang="en-NZ" smtClean="0"/>
-              <a:t>13/02/2012</a:t>
+              <a:t>20/02/2012</a:t>
             </a:fld>
             <a:endParaRPr lang="en-NZ"/>
           </a:p>
@@ -1226,7 +1226,7 @@
           <a:p>
             <a:fld id="{3ACCE87F-A4BF-4D9A-9320-ACD565033031}" type="datetimeFigureOut">
               <a:rPr lang="en-NZ" smtClean="0"/>
-              <a:t>13/02/2012</a:t>
+              <a:t>20/02/2012</a:t>
             </a:fld>
             <a:endParaRPr lang="en-NZ"/>
           </a:p>
@@ -1509,7 +1509,7 @@
           <a:p>
             <a:fld id="{3ACCE87F-A4BF-4D9A-9320-ACD565033031}" type="datetimeFigureOut">
               <a:rPr lang="en-NZ" smtClean="0"/>
-              <a:t>13/02/2012</a:t>
+              <a:t>20/02/2012</a:t>
             </a:fld>
             <a:endParaRPr lang="en-NZ"/>
           </a:p>
@@ -1926,7 +1926,7 @@
           <a:p>
             <a:fld id="{3ACCE87F-A4BF-4D9A-9320-ACD565033031}" type="datetimeFigureOut">
               <a:rPr lang="en-NZ" smtClean="0"/>
-              <a:t>13/02/2012</a:t>
+              <a:t>20/02/2012</a:t>
             </a:fld>
             <a:endParaRPr lang="en-NZ"/>
           </a:p>
@@ -2039,7 +2039,7 @@
           <a:p>
             <a:fld id="{3ACCE87F-A4BF-4D9A-9320-ACD565033031}" type="datetimeFigureOut">
               <a:rPr lang="en-NZ" smtClean="0"/>
-              <a:t>13/02/2012</a:t>
+              <a:t>20/02/2012</a:t>
             </a:fld>
             <a:endParaRPr lang="en-NZ"/>
           </a:p>
@@ -2129,7 +2129,7 @@
           <a:p>
             <a:fld id="{3ACCE87F-A4BF-4D9A-9320-ACD565033031}" type="datetimeFigureOut">
               <a:rPr lang="en-NZ" smtClean="0"/>
-              <a:t>13/02/2012</a:t>
+              <a:t>20/02/2012</a:t>
             </a:fld>
             <a:endParaRPr lang="en-NZ"/>
           </a:p>
@@ -2401,7 +2401,7 @@
           <a:p>
             <a:fld id="{3ACCE87F-A4BF-4D9A-9320-ACD565033031}" type="datetimeFigureOut">
               <a:rPr lang="en-NZ" smtClean="0"/>
-              <a:t>13/02/2012</a:t>
+              <a:t>20/02/2012</a:t>
             </a:fld>
             <a:endParaRPr lang="en-NZ"/>
           </a:p>
@@ -2649,7 +2649,7 @@
           <a:p>
             <a:fld id="{3ACCE87F-A4BF-4D9A-9320-ACD565033031}" type="datetimeFigureOut">
               <a:rPr lang="en-NZ" smtClean="0"/>
-              <a:t>13/02/2012</a:t>
+              <a:t>20/02/2012</a:t>
             </a:fld>
             <a:endParaRPr lang="en-NZ"/>
           </a:p>
@@ -2857,7 +2857,7 @@
           <a:p>
             <a:fld id="{3ACCE87F-A4BF-4D9A-9320-ACD565033031}" type="datetimeFigureOut">
               <a:rPr lang="en-NZ" smtClean="0"/>
-              <a:t>13/02/2012</a:t>
+              <a:t>20/02/2012</a:t>
             </a:fld>
             <a:endParaRPr lang="en-NZ"/>
           </a:p>
@@ -9858,8 +9858,13 @@
             <a:pPr lvl="1"/>
             <a:r>
               <a:rPr lang="en-NZ" dirty="0" smtClean="0"/>
-              <a:t>transformations can occur across multiple iterations and statistics can by generated from the results of each iteration</a:t>
-            </a:r>
+              <a:t>transformations can occur </a:t>
+            </a:r>
+            <a:r>
+              <a:rPr lang="en-NZ" dirty="0" smtClean="0"/>
+              <a:t>each iteration</a:t>
+            </a:r>
+            <a:endParaRPr lang="en-NZ" dirty="0" smtClean="0"/>
           </a:p>
           <a:p>
             <a:pPr lvl="1"/>
@@ -9882,14 +9887,18 @@
           <a:p>
             <a:pPr lvl="2"/>
             <a:r>
-              <a:rPr lang="en-NZ" dirty="0" smtClean="0"/>
-              <a:t>transformation probabilities specified in a file</a:t>
-            </a:r>
-          </a:p>
-          <a:p>
-            <a:r>
-              <a:rPr lang="en-NZ" dirty="0" smtClean="0"/>
-              <a:t>Generate descriptive statistics from the results of each iteration including frequencies, means, </a:t>
+              <a:rPr lang="en-NZ" dirty="0"/>
+              <a:t>transformations according to discrete probabilities specified in code or a file</a:t>
+            </a:r>
+          </a:p>
+          <a:p>
+            <a:r>
+              <a:rPr lang="en-NZ" dirty="0" smtClean="0"/>
+              <a:t>Generate and track descriptive </a:t>
+            </a:r>
+            <a:r>
+              <a:rPr lang="en-NZ" dirty="0" smtClean="0"/>
+              <a:t>statistics from the results of each iteration including frequencies, means, </a:t>
             </a:r>
             <a:r>
               <a:rPr lang="en-NZ" dirty="0" err="1" smtClean="0"/>
@@ -9903,7 +9912,23 @@
           <a:p>
             <a:r>
               <a:rPr lang="en-NZ" dirty="0" smtClean="0"/>
-              <a:t>Perform multiple runs of simulation and average descriptive statistics across multiple runs</a:t>
+              <a:t>Perform multiple </a:t>
+            </a:r>
+            <a:r>
+              <a:rPr lang="en-NZ" dirty="0" smtClean="0"/>
+              <a:t>simulation runs and </a:t>
+            </a:r>
+            <a:r>
+              <a:rPr lang="en-NZ" dirty="0" smtClean="0"/>
+              <a:t>average </a:t>
+            </a:r>
+            <a:r>
+              <a:rPr lang="en-NZ" dirty="0" smtClean="0"/>
+              <a:t>tracked descriptive </a:t>
+            </a:r>
+            <a:r>
+              <a:rPr lang="en-NZ" dirty="0" smtClean="0"/>
+              <a:t>statistics across multiple runs</a:t>
             </a:r>
           </a:p>
           <a:p>

</xml_diff>

<commit_message>
add demo scenario 1
</commit_message>
<xml_diff>
--- a/src/docs/Simar overview.pptx
+++ b/src/docs/Simar overview.pptx
@@ -216,7 +216,7 @@
           <a:p>
             <a:fld id="{FCC0B684-8014-45B5-B9C4-47CA9572B093}" type="datetimeFigureOut">
               <a:rPr lang="en-NZ" smtClean="0"/>
-              <a:t>20/02/2012</a:t>
+              <a:t>23/02/2012</a:t>
             </a:fld>
             <a:endParaRPr lang="en-NZ"/>
           </a:p>
@@ -480,7 +480,7 @@
           <a:p>
             <a:fld id="{3ACCE87F-A4BF-4D9A-9320-ACD565033031}" type="datetimeFigureOut">
               <a:rPr lang="en-NZ" smtClean="0"/>
-              <a:t>20/02/2012</a:t>
+              <a:t>23/02/2012</a:t>
             </a:fld>
             <a:endParaRPr lang="en-NZ"/>
           </a:p>
@@ -645,7 +645,7 @@
           <a:p>
             <a:fld id="{3ACCE87F-A4BF-4D9A-9320-ACD565033031}" type="datetimeFigureOut">
               <a:rPr lang="en-NZ" smtClean="0"/>
-              <a:t>20/02/2012</a:t>
+              <a:t>23/02/2012</a:t>
             </a:fld>
             <a:endParaRPr lang="en-NZ"/>
           </a:p>
@@ -820,7 +820,7 @@
           <a:p>
             <a:fld id="{3ACCE87F-A4BF-4D9A-9320-ACD565033031}" type="datetimeFigureOut">
               <a:rPr lang="en-NZ" smtClean="0"/>
-              <a:t>20/02/2012</a:t>
+              <a:t>23/02/2012</a:t>
             </a:fld>
             <a:endParaRPr lang="en-NZ"/>
           </a:p>
@@ -985,7 +985,7 @@
           <a:p>
             <a:fld id="{3ACCE87F-A4BF-4D9A-9320-ACD565033031}" type="datetimeFigureOut">
               <a:rPr lang="en-NZ" smtClean="0"/>
-              <a:t>20/02/2012</a:t>
+              <a:t>23/02/2012</a:t>
             </a:fld>
             <a:endParaRPr lang="en-NZ"/>
           </a:p>
@@ -1226,7 +1226,7 @@
           <a:p>
             <a:fld id="{3ACCE87F-A4BF-4D9A-9320-ACD565033031}" type="datetimeFigureOut">
               <a:rPr lang="en-NZ" smtClean="0"/>
-              <a:t>20/02/2012</a:t>
+              <a:t>23/02/2012</a:t>
             </a:fld>
             <a:endParaRPr lang="en-NZ"/>
           </a:p>
@@ -1509,7 +1509,7 @@
           <a:p>
             <a:fld id="{3ACCE87F-A4BF-4D9A-9320-ACD565033031}" type="datetimeFigureOut">
               <a:rPr lang="en-NZ" smtClean="0"/>
-              <a:t>20/02/2012</a:t>
+              <a:t>23/02/2012</a:t>
             </a:fld>
             <a:endParaRPr lang="en-NZ"/>
           </a:p>
@@ -1926,7 +1926,7 @@
           <a:p>
             <a:fld id="{3ACCE87F-A4BF-4D9A-9320-ACD565033031}" type="datetimeFigureOut">
               <a:rPr lang="en-NZ" smtClean="0"/>
-              <a:t>20/02/2012</a:t>
+              <a:t>23/02/2012</a:t>
             </a:fld>
             <a:endParaRPr lang="en-NZ"/>
           </a:p>
@@ -2039,7 +2039,7 @@
           <a:p>
             <a:fld id="{3ACCE87F-A4BF-4D9A-9320-ACD565033031}" type="datetimeFigureOut">
               <a:rPr lang="en-NZ" smtClean="0"/>
-              <a:t>20/02/2012</a:t>
+              <a:t>23/02/2012</a:t>
             </a:fld>
             <a:endParaRPr lang="en-NZ"/>
           </a:p>
@@ -2129,7 +2129,7 @@
           <a:p>
             <a:fld id="{3ACCE87F-A4BF-4D9A-9320-ACD565033031}" type="datetimeFigureOut">
               <a:rPr lang="en-NZ" smtClean="0"/>
-              <a:t>20/02/2012</a:t>
+              <a:t>23/02/2012</a:t>
             </a:fld>
             <a:endParaRPr lang="en-NZ"/>
           </a:p>
@@ -2401,7 +2401,7 @@
           <a:p>
             <a:fld id="{3ACCE87F-A4BF-4D9A-9320-ACD565033031}" type="datetimeFigureOut">
               <a:rPr lang="en-NZ" smtClean="0"/>
-              <a:t>20/02/2012</a:t>
+              <a:t>23/02/2012</a:t>
             </a:fld>
             <a:endParaRPr lang="en-NZ"/>
           </a:p>
@@ -2649,7 +2649,7 @@
           <a:p>
             <a:fld id="{3ACCE87F-A4BF-4D9A-9320-ACD565033031}" type="datetimeFigureOut">
               <a:rPr lang="en-NZ" smtClean="0"/>
-              <a:t>20/02/2012</a:t>
+              <a:t>23/02/2012</a:t>
             </a:fld>
             <a:endParaRPr lang="en-NZ"/>
           </a:p>
@@ -2857,7 +2857,7 @@
           <a:p>
             <a:fld id="{3ACCE87F-A4BF-4D9A-9320-ACD565033031}" type="datetimeFigureOut">
               <a:rPr lang="en-NZ" smtClean="0"/>
-              <a:t>20/02/2012</a:t>
+              <a:t>23/02/2012</a:t>
             </a:fld>
             <a:endParaRPr lang="en-NZ"/>
           </a:p>
@@ -9845,7 +9845,7 @@
         <p:spPr/>
         <p:txBody>
           <a:bodyPr>
-            <a:normAutofit fontScale="62500" lnSpcReduction="20000"/>
+            <a:normAutofit fontScale="55000" lnSpcReduction="20000"/>
           </a:bodyPr>
           <a:lstStyle/>
           <a:p>
@@ -9858,13 +9858,8 @@
             <a:pPr lvl="1"/>
             <a:r>
               <a:rPr lang="en-NZ" dirty="0" smtClean="0"/>
-              <a:t>transformations can occur </a:t>
-            </a:r>
-            <a:r>
-              <a:rPr lang="en-NZ" dirty="0" smtClean="0"/>
-              <a:t>each iteration</a:t>
-            </a:r>
-            <a:endParaRPr lang="en-NZ" dirty="0" smtClean="0"/>
+              <a:t>transformations can occur each iteration</a:t>
+            </a:r>
           </a:p>
           <a:p>
             <a:pPr lvl="1"/>
@@ -9894,11 +9889,7 @@
           <a:p>
             <a:r>
               <a:rPr lang="en-NZ" dirty="0" smtClean="0"/>
-              <a:t>Generate and track descriptive </a:t>
-            </a:r>
-            <a:r>
-              <a:rPr lang="en-NZ" dirty="0" smtClean="0"/>
-              <a:t>statistics from the results of each iteration including frequencies, means, </a:t>
+              <a:t>Generate and track descriptive statistics from the results of each iteration including frequencies, means, </a:t>
             </a:r>
             <a:r>
               <a:rPr lang="en-NZ" dirty="0" err="1" smtClean="0"/>
@@ -9906,29 +9897,40 @@
             </a:r>
             <a:r>
               <a:rPr lang="en-NZ" dirty="0" smtClean="0"/>
-              <a:t>, and summaries</a:t>
-            </a:r>
-          </a:p>
-          <a:p>
-            <a:r>
-              <a:rPr lang="en-NZ" dirty="0" smtClean="0"/>
-              <a:t>Perform multiple </a:t>
-            </a:r>
-            <a:r>
-              <a:rPr lang="en-NZ" dirty="0" smtClean="0"/>
-              <a:t>simulation runs and </a:t>
-            </a:r>
-            <a:r>
-              <a:rPr lang="en-NZ" dirty="0" smtClean="0"/>
-              <a:t>average </a:t>
-            </a:r>
-            <a:r>
-              <a:rPr lang="en-NZ" dirty="0" smtClean="0"/>
-              <a:t>tracked descriptive </a:t>
-            </a:r>
-            <a:r>
-              <a:rPr lang="en-NZ" dirty="0" smtClean="0"/>
-              <a:t>statistics across multiple runs</a:t>
+              <a:t>, and </a:t>
+            </a:r>
+            <a:r>
+              <a:rPr lang="en-NZ" dirty="0" smtClean="0"/>
+              <a:t>summaries</a:t>
+            </a:r>
+          </a:p>
+          <a:p>
+            <a:pPr lvl="1"/>
+            <a:r>
+              <a:rPr lang="en-NZ" dirty="0" smtClean="0"/>
+              <a:t>Statistics can be generated for the whole population, or subsets</a:t>
+            </a:r>
+          </a:p>
+          <a:p>
+            <a:pPr lvl="1"/>
+            <a:r>
+              <a:rPr lang="en-NZ" dirty="0" smtClean="0"/>
+              <a:t>Statistics can be grouped by base variables (</a:t>
+            </a:r>
+            <a:r>
+              <a:rPr lang="en-NZ" dirty="0" err="1" smtClean="0"/>
+              <a:t>ie</a:t>
+            </a:r>
+            <a:r>
+              <a:rPr lang="en-NZ" dirty="0" smtClean="0"/>
+              <a:t>: variables that don’t change during the simulation)</a:t>
+            </a:r>
+            <a:endParaRPr lang="en-NZ" dirty="0" smtClean="0"/>
+          </a:p>
+          <a:p>
+            <a:r>
+              <a:rPr lang="en-NZ" dirty="0" smtClean="0"/>
+              <a:t>Perform multiple simulation runs and average tracked descriptive statistics across multiple runs</a:t>
             </a:r>
           </a:p>
           <a:p>

</xml_diff>

<commit_message>
renamed runs -> runstats
renamed runs -> runstats, runs.averaged ->
runstats.collated, calcFinalResult -> collateRunStats
</commit_message>
<xml_diff>
--- a/src/docs/Simar overview.pptx
+++ b/src/docs/Simar overview.pptx
@@ -216,7 +216,7 @@
           <a:p>
             <a:fld id="{FCC0B684-8014-45B5-B9C4-47CA9572B093}" type="datetimeFigureOut">
               <a:rPr lang="en-NZ" smtClean="0"/>
-              <a:t>23/02/2012</a:t>
+              <a:t>8/03/2012</a:t>
             </a:fld>
             <a:endParaRPr lang="en-NZ"/>
           </a:p>
@@ -480,7 +480,7 @@
           <a:p>
             <a:fld id="{3ACCE87F-A4BF-4D9A-9320-ACD565033031}" type="datetimeFigureOut">
               <a:rPr lang="en-NZ" smtClean="0"/>
-              <a:t>23/02/2012</a:t>
+              <a:t>8/03/2012</a:t>
             </a:fld>
             <a:endParaRPr lang="en-NZ"/>
           </a:p>
@@ -645,7 +645,7 @@
           <a:p>
             <a:fld id="{3ACCE87F-A4BF-4D9A-9320-ACD565033031}" type="datetimeFigureOut">
               <a:rPr lang="en-NZ" smtClean="0"/>
-              <a:t>23/02/2012</a:t>
+              <a:t>8/03/2012</a:t>
             </a:fld>
             <a:endParaRPr lang="en-NZ"/>
           </a:p>
@@ -820,7 +820,7 @@
           <a:p>
             <a:fld id="{3ACCE87F-A4BF-4D9A-9320-ACD565033031}" type="datetimeFigureOut">
               <a:rPr lang="en-NZ" smtClean="0"/>
-              <a:t>23/02/2012</a:t>
+              <a:t>8/03/2012</a:t>
             </a:fld>
             <a:endParaRPr lang="en-NZ"/>
           </a:p>
@@ -985,7 +985,7 @@
           <a:p>
             <a:fld id="{3ACCE87F-A4BF-4D9A-9320-ACD565033031}" type="datetimeFigureOut">
               <a:rPr lang="en-NZ" smtClean="0"/>
-              <a:t>23/02/2012</a:t>
+              <a:t>8/03/2012</a:t>
             </a:fld>
             <a:endParaRPr lang="en-NZ"/>
           </a:p>
@@ -1226,7 +1226,7 @@
           <a:p>
             <a:fld id="{3ACCE87F-A4BF-4D9A-9320-ACD565033031}" type="datetimeFigureOut">
               <a:rPr lang="en-NZ" smtClean="0"/>
-              <a:t>23/02/2012</a:t>
+              <a:t>8/03/2012</a:t>
             </a:fld>
             <a:endParaRPr lang="en-NZ"/>
           </a:p>
@@ -1509,7 +1509,7 @@
           <a:p>
             <a:fld id="{3ACCE87F-A4BF-4D9A-9320-ACD565033031}" type="datetimeFigureOut">
               <a:rPr lang="en-NZ" smtClean="0"/>
-              <a:t>23/02/2012</a:t>
+              <a:t>8/03/2012</a:t>
             </a:fld>
             <a:endParaRPr lang="en-NZ"/>
           </a:p>
@@ -1926,7 +1926,7 @@
           <a:p>
             <a:fld id="{3ACCE87F-A4BF-4D9A-9320-ACD565033031}" type="datetimeFigureOut">
               <a:rPr lang="en-NZ" smtClean="0"/>
-              <a:t>23/02/2012</a:t>
+              <a:t>8/03/2012</a:t>
             </a:fld>
             <a:endParaRPr lang="en-NZ"/>
           </a:p>
@@ -2039,7 +2039,7 @@
           <a:p>
             <a:fld id="{3ACCE87F-A4BF-4D9A-9320-ACD565033031}" type="datetimeFigureOut">
               <a:rPr lang="en-NZ" smtClean="0"/>
-              <a:t>23/02/2012</a:t>
+              <a:t>8/03/2012</a:t>
             </a:fld>
             <a:endParaRPr lang="en-NZ"/>
           </a:p>
@@ -2129,7 +2129,7 @@
           <a:p>
             <a:fld id="{3ACCE87F-A4BF-4D9A-9320-ACD565033031}" type="datetimeFigureOut">
               <a:rPr lang="en-NZ" smtClean="0"/>
-              <a:t>23/02/2012</a:t>
+              <a:t>8/03/2012</a:t>
             </a:fld>
             <a:endParaRPr lang="en-NZ"/>
           </a:p>
@@ -2401,7 +2401,7 @@
           <a:p>
             <a:fld id="{3ACCE87F-A4BF-4D9A-9320-ACD565033031}" type="datetimeFigureOut">
               <a:rPr lang="en-NZ" smtClean="0"/>
-              <a:t>23/02/2012</a:t>
+              <a:t>8/03/2012</a:t>
             </a:fld>
             <a:endParaRPr lang="en-NZ"/>
           </a:p>
@@ -2649,7 +2649,7 @@
           <a:p>
             <a:fld id="{3ACCE87F-A4BF-4D9A-9320-ACD565033031}" type="datetimeFigureOut">
               <a:rPr lang="en-NZ" smtClean="0"/>
-              <a:t>23/02/2012</a:t>
+              <a:t>8/03/2012</a:t>
             </a:fld>
             <a:endParaRPr lang="en-NZ"/>
           </a:p>
@@ -2857,7 +2857,7 @@
           <a:p>
             <a:fld id="{3ACCE87F-A4BF-4D9A-9320-ACD565033031}" type="datetimeFigureOut">
               <a:rPr lang="en-NZ" smtClean="0"/>
-              <a:t>23/02/2012</a:t>
+              <a:t>8/03/2012</a:t>
             </a:fld>
             <a:endParaRPr lang="en-NZ"/>
           </a:p>
@@ -3600,7 +3600,15 @@
             </a:r>
             <a:r>
               <a:rPr lang="en-NZ" dirty="0" smtClean="0"/>
-              <a:t>simulation and were all the work is done</a:t>
+              <a:t>simulation and </a:t>
+            </a:r>
+            <a:r>
+              <a:rPr lang="en-NZ" dirty="0" smtClean="0"/>
+              <a:t>where </a:t>
+            </a:r>
+            <a:r>
+              <a:rPr lang="en-NZ" dirty="0" smtClean="0"/>
+              <a:t>all the work is done</a:t>
             </a:r>
           </a:p>
           <a:p>
@@ -3705,7 +3713,7 @@
         <p:spPr/>
         <p:txBody>
           <a:bodyPr>
-            <a:normAutofit fontScale="85000" lnSpcReduction="20000"/>
+            <a:normAutofit fontScale="85000" lnSpcReduction="10000"/>
           </a:bodyPr>
           <a:lstStyle/>
           <a:p>
@@ -3769,13 +3777,21 @@
             </a:r>
             <a:r>
               <a:rPr lang="en-NZ" dirty="0" smtClean="0"/>
-              <a:t>summaries for each outcome and iteration. Stores them with stats from previous runs.</a:t>
+              <a:t>summaries for </a:t>
+            </a:r>
+            <a:r>
+              <a:rPr lang="en-NZ" dirty="0" smtClean="0"/>
+              <a:t>any </a:t>
+            </a:r>
+            <a:r>
+              <a:rPr lang="en-NZ" dirty="0" smtClean="0"/>
+              <a:t>outcome and iteration. Stores them with stats from previous runs.</a:t>
             </a:r>
           </a:p>
           <a:p>
             <a:r>
               <a:rPr lang="en-NZ" dirty="0" err="1" smtClean="0"/>
-              <a:t>calcFinalStats</a:t>
+              <a:t>collateRunStats</a:t>
             </a:r>
             <a:endParaRPr lang="en-NZ" dirty="0" smtClean="0"/>
           </a:p>
@@ -3783,7 +3799,15 @@
             <a:pPr lvl="1"/>
             <a:r>
               <a:rPr lang="en-NZ" dirty="0" smtClean="0"/>
-              <a:t>calculates the mean of run stats over multiple iterations and prepares results for display by adding column names etc.</a:t>
+              <a:t>calculates the mean of run stats over multiple </a:t>
+            </a:r>
+            <a:r>
+              <a:rPr lang="en-NZ" dirty="0" smtClean="0"/>
+              <a:t>runs and </a:t>
+            </a:r>
+            <a:r>
+              <a:rPr lang="en-NZ" dirty="0" smtClean="0"/>
+              <a:t>prepares results for display by adding column names etc.</a:t>
             </a:r>
           </a:p>
           <a:p>
@@ -3871,7 +3895,7 @@
         <p:spPr/>
         <p:txBody>
           <a:bodyPr>
-            <a:normAutofit fontScale="92500" lnSpcReduction="20000"/>
+            <a:normAutofit fontScale="85000" lnSpcReduction="20000"/>
           </a:bodyPr>
           <a:lstStyle/>
           <a:p>
@@ -3918,9 +3942,10 @@
           </a:p>
           <a:p>
             <a:r>
-              <a:rPr lang="en-NZ" dirty="0" smtClean="0"/>
-              <a:t>runs</a:t>
-            </a:r>
+              <a:rPr lang="en-NZ" dirty="0" err="1" smtClean="0"/>
+              <a:t>runstats</a:t>
+            </a:r>
+            <a:endParaRPr lang="en-NZ" dirty="0" smtClean="0"/>
           </a:p>
           <a:p>
             <a:pPr lvl="1"/>
@@ -3935,42 +3960,84 @@
               </a:rPr>
               <a:t>appendRunStats</a:t>
             </a:r>
+            <a:endParaRPr lang="en-NZ" sz="2600" dirty="0" smtClean="0">
+              <a:latin typeface="Courier New" pitchFamily="49" charset="0"/>
+              <a:cs typeface="Courier New" pitchFamily="49" charset="0"/>
+            </a:endParaRPr>
+          </a:p>
+          <a:p>
+            <a:pPr lvl="1"/>
+            <a:r>
+              <a:rPr lang="en-NZ" dirty="0"/>
+              <a:t>a list of run </a:t>
+            </a:r>
+            <a:r>
+              <a:rPr lang="en-NZ" dirty="0" smtClean="0"/>
+              <a:t>stats. Each element contains </a:t>
+            </a:r>
+            <a:r>
+              <a:rPr lang="en-NZ" dirty="0" err="1" smtClean="0"/>
+              <a:t>runstats</a:t>
+            </a:r>
+            <a:r>
+              <a:rPr lang="en-NZ" dirty="0" smtClean="0"/>
+              <a:t> for all runs.</a:t>
+            </a:r>
             <a:endParaRPr lang="en-NZ" dirty="0" smtClean="0"/>
           </a:p>
           <a:p>
+            <a:r>
+              <a:rPr lang="en-NZ" dirty="0" err="1" smtClean="0"/>
+              <a:t>runstats.collated</a:t>
+            </a:r>
+            <a:endParaRPr lang="en-NZ" dirty="0" smtClean="0"/>
+          </a:p>
+          <a:p>
             <a:pPr lvl="1"/>
             <a:r>
-              <a:rPr lang="en-NZ" dirty="0" smtClean="0"/>
-              <a:t>Contains run stats for all runs</a:t>
-            </a:r>
-          </a:p>
-          <a:p>
-            <a:pPr lvl="1"/>
-            <a:r>
-              <a:rPr lang="en-NZ" dirty="0" smtClean="0"/>
-              <a:t>a list of run stats</a:t>
-            </a:r>
-          </a:p>
-          <a:p>
-            <a:r>
-              <a:rPr lang="en-NZ" smtClean="0"/>
-              <a:t>runs.averaged</a:t>
-            </a:r>
-            <a:endParaRPr lang="en-NZ" dirty="0" smtClean="0"/>
-          </a:p>
-          <a:p>
-            <a:pPr lvl="1"/>
-            <a:r>
-              <a:rPr lang="en-NZ" dirty="0" smtClean="0"/>
+              <a:rPr lang="en-NZ" dirty="0"/>
               <a:t>results of </a:t>
             </a:r>
             <a:r>
-              <a:rPr lang="en-NZ" sz="2600" dirty="0" err="1" smtClean="0">
+              <a:rPr lang="en-NZ" dirty="0" err="1">
                 <a:latin typeface="Courier New" pitchFamily="49" charset="0"/>
                 <a:cs typeface="Courier New" pitchFamily="49" charset="0"/>
               </a:rPr>
-              <a:t>calcFinalResults</a:t>
-            </a:r>
+              <a:t>collateRunStats</a:t>
+            </a:r>
+            <a:endParaRPr lang="en-NZ" dirty="0">
+              <a:latin typeface="Courier New" pitchFamily="49" charset="0"/>
+              <a:cs typeface="Courier New" pitchFamily="49" charset="0"/>
+            </a:endParaRPr>
+          </a:p>
+          <a:p>
+            <a:pPr lvl="1"/>
+            <a:r>
+              <a:rPr lang="en-NZ" dirty="0" smtClean="0"/>
+              <a:t>Each element contains </a:t>
+            </a:r>
+            <a:r>
+              <a:rPr lang="en-NZ" dirty="0" err="1" smtClean="0"/>
+              <a:t>runstats</a:t>
+            </a:r>
+            <a:r>
+              <a:rPr lang="en-NZ" dirty="0" smtClean="0"/>
+              <a:t> averaged across all runs</a:t>
+            </a:r>
+            <a:endParaRPr lang="en-NZ" sz="2600" dirty="0" smtClean="0">
+              <a:latin typeface="Courier New" pitchFamily="49" charset="0"/>
+              <a:cs typeface="Courier New" pitchFamily="49" charset="0"/>
+            </a:endParaRPr>
+          </a:p>
+          <a:p>
+            <a:pPr lvl="1"/>
+            <a:endParaRPr lang="en-NZ" sz="2600" dirty="0" smtClean="0">
+              <a:latin typeface="Courier New" pitchFamily="49" charset="0"/>
+              <a:cs typeface="Courier New" pitchFamily="49" charset="0"/>
+            </a:endParaRPr>
+          </a:p>
+          <a:p>
+            <a:pPr lvl="1"/>
             <a:endParaRPr lang="en-NZ" dirty="0" smtClean="0">
               <a:latin typeface="Courier New" pitchFamily="49" charset="0"/>
               <a:cs typeface="Courier New" pitchFamily="49" charset="0"/>
@@ -9483,100 +9550,42 @@
           <a:p>
             <a:r>
               <a:rPr lang="en-NZ" dirty="0" smtClean="0"/>
-              <a:t>A </a:t>
-            </a:r>
-            <a:r>
-              <a:rPr lang="en-NZ" dirty="0"/>
-              <a:t>run stat is essentially a function that </a:t>
-            </a:r>
-            <a:r>
-              <a:rPr lang="en-NZ" dirty="0" smtClean="0"/>
-              <a:t>takes </a:t>
-            </a:r>
-            <a:r>
-              <a:rPr lang="en-NZ" dirty="0"/>
-              <a:t>an outcome matrix and produces an aggregate value </a:t>
-            </a:r>
-            <a:r>
-              <a:rPr lang="en-NZ" b="1" dirty="0"/>
-              <a:t>for each </a:t>
-            </a:r>
-            <a:r>
-              <a:rPr lang="en-NZ" b="1" dirty="0" smtClean="0"/>
-              <a:t>iteration</a:t>
-            </a:r>
-          </a:p>
-          <a:p>
-            <a:pPr lvl="1">
-              <a:lnSpc>
-                <a:spcPct val="115000"/>
-              </a:lnSpc>
-              <a:spcAft>
-                <a:spcPts val="1000"/>
-              </a:spcAft>
-            </a:pPr>
-            <a:r>
-              <a:rPr lang="en-NZ" kern="1800" dirty="0">
-                <a:highlight>
-                  <a:srgbClr val="FFFF00"/>
-                </a:highlight>
-                <a:ea typeface="Times New Roman"/>
-                <a:cs typeface="Times New Roman"/>
-              </a:rPr>
-              <a:t>Some output results may not be required per iteration, rather only the final state is required. </a:t>
-            </a:r>
-            <a:r>
-              <a:rPr lang="en-NZ" kern="1800" smtClean="0">
-                <a:highlight>
-                  <a:srgbClr val="FFFF00"/>
-                </a:highlight>
-                <a:ea typeface="Times New Roman"/>
-                <a:cs typeface="Times New Roman"/>
-              </a:rPr>
-              <a:t>These </a:t>
-            </a:r>
-            <a:r>
-              <a:rPr lang="en-NZ" kern="1800" dirty="0">
-                <a:highlight>
-                  <a:srgbClr val="FFFF00"/>
-                </a:highlight>
-                <a:ea typeface="Times New Roman"/>
-                <a:cs typeface="Times New Roman"/>
-              </a:rPr>
-              <a:t>are not considered run </a:t>
-            </a:r>
-            <a:r>
-              <a:rPr lang="en-NZ" kern="1800" dirty="0" smtClean="0">
-                <a:highlight>
-                  <a:srgbClr val="FFFF00"/>
-                </a:highlight>
-                <a:ea typeface="Times New Roman"/>
-                <a:cs typeface="Times New Roman"/>
-              </a:rPr>
-              <a:t>stats.</a:t>
-            </a:r>
-          </a:p>
-          <a:p>
-            <a:pPr>
-              <a:lnSpc>
-                <a:spcPct val="115000"/>
-              </a:lnSpc>
-              <a:spcAft>
-                <a:spcPts val="1000"/>
-              </a:spcAft>
-            </a:pPr>
-            <a:r>
-              <a:rPr lang="en-NZ" dirty="0" smtClean="0"/>
-              <a:t>This </a:t>
-            </a:r>
-            <a:r>
-              <a:rPr lang="en-NZ" dirty="0"/>
-              <a:t>aggregate value may </a:t>
-            </a:r>
-            <a:r>
-              <a:rPr lang="en-NZ" dirty="0" smtClean="0"/>
-              <a:t>be</a:t>
-            </a:r>
+              <a:t>A run stat is any value from any outcome that you wish record and track across multiple runs</a:t>
+            </a:r>
+            <a:endParaRPr lang="en-NZ" dirty="0" smtClean="0"/>
+          </a:p>
+          <a:p>
+            <a:r>
+              <a:rPr lang="en-NZ" dirty="0" smtClean="0"/>
+              <a:t>Typically a run stat is an aggregate value calculated across each iteration (</a:t>
+            </a:r>
+            <a:r>
+              <a:rPr lang="en-NZ" dirty="0" err="1" smtClean="0"/>
+              <a:t>eg</a:t>
+            </a:r>
+            <a:r>
+              <a:rPr lang="en-NZ" dirty="0" smtClean="0"/>
+              <a:t>: a mean for </a:t>
+            </a:r>
+            <a:r>
+              <a:rPr lang="en-NZ" smtClean="0"/>
+              <a:t>each iteration) </a:t>
+            </a:r>
+            <a:r>
+              <a:rPr lang="en-NZ" dirty="0" smtClean="0"/>
+              <a:t>although it could be a result from a specific iteration</a:t>
+            </a:r>
+          </a:p>
+          <a:p>
+            <a:r>
+              <a:rPr lang="en-NZ" dirty="0" smtClean="0"/>
+              <a:t>Example of run stats </a:t>
+            </a:r>
+            <a:r>
+              <a:rPr lang="en-NZ" dirty="0" smtClean="0"/>
+              <a:t>include:</a:t>
+            </a:r>
+            <a:endParaRPr lang="en-NZ" dirty="0" smtClean="0"/>
           </a:p>
           <a:p>
             <a:pPr lvl="1"/>
@@ -9634,7 +9643,15 @@
           <a:p>
             <a:r>
               <a:rPr lang="en-NZ" dirty="0" smtClean="0"/>
-              <a:t>Run stats are available to produce</a:t>
+              <a:t>Run </a:t>
+            </a:r>
+            <a:r>
+              <a:rPr lang="en-NZ" dirty="0" smtClean="0"/>
+              <a:t>stat functions are </a:t>
+            </a:r>
+            <a:r>
+              <a:rPr lang="en-NZ" dirty="0" smtClean="0"/>
+              <a:t>available to produce</a:t>
             </a:r>
           </a:p>
           <a:p>
@@ -9713,7 +9730,7 @@
           <a:p>
             <a:r>
               <a:rPr lang="en-NZ" dirty="0" err="1" smtClean="0"/>
-              <a:t>calcFinalResults</a:t>
+              <a:t>collateRunStats</a:t>
             </a:r>
             <a:endParaRPr lang="en-NZ" dirty="0"/>
           </a:p>
@@ -9889,7 +9906,15 @@
           <a:p>
             <a:r>
               <a:rPr lang="en-NZ" dirty="0" smtClean="0"/>
-              <a:t>Generate and track descriptive statistics from the results of each iteration including frequencies, means, </a:t>
+              <a:t>Generate </a:t>
+            </a:r>
+            <a:r>
+              <a:rPr lang="en-NZ" dirty="0" smtClean="0"/>
+              <a:t>descriptive </a:t>
+            </a:r>
+            <a:r>
+              <a:rPr lang="en-NZ" dirty="0" smtClean="0"/>
+              <a:t>statistics from the results of each iteration including frequencies, means, </a:t>
             </a:r>
             <a:r>
               <a:rPr lang="en-NZ" dirty="0" err="1" smtClean="0"/>
@@ -9897,11 +9922,7 @@
             </a:r>
             <a:r>
               <a:rPr lang="en-NZ" dirty="0" smtClean="0"/>
-              <a:t>, and </a:t>
-            </a:r>
-            <a:r>
-              <a:rPr lang="en-NZ" dirty="0" smtClean="0"/>
-              <a:t>summaries</a:t>
+              <a:t>, and summaries</a:t>
             </a:r>
           </a:p>
           <a:p>
@@ -9925,7 +9946,6 @@
               <a:rPr lang="en-NZ" dirty="0" smtClean="0"/>
               <a:t>: variables that don’t change during the simulation)</a:t>
             </a:r>
-            <a:endParaRPr lang="en-NZ" dirty="0" smtClean="0"/>
           </a:p>
           <a:p>
             <a:r>

</xml_diff>